<commit_message>
Aktuellere Version Enthält nun Zeitplan, Meilensteine und Risiken
</commit_message>
<xml_diff>
--- a/Planung/GDV- Das Projekt.pptx
+++ b/Planung/GDV- Das Projekt.pptx
@@ -11,8 +11,10 @@
     <p:sldId id="259" r:id="rId5"/>
     <p:sldId id="260" r:id="rId6"/>
     <p:sldId id="261" r:id="rId7"/>
-    <p:sldId id="262" r:id="rId8"/>
-    <p:sldId id="263" r:id="rId9"/>
+    <p:sldId id="265" r:id="rId8"/>
+    <p:sldId id="262" r:id="rId9"/>
+    <p:sldId id="264" r:id="rId10"/>
+    <p:sldId id="263" r:id="rId11"/>
   </p:sldIdLst>
   <p:sldSz cx="12192000" cy="6858000"/>
   <p:notesSz cx="6858000" cy="9144000"/>
@@ -2993,7 +2995,11 @@
           <a:p>
             <a:r>
               <a:rPr lang="de-DE" dirty="0" smtClean="0"/>
-              <a:t>GDV- Das Projekt</a:t>
+              <a:t>GDV- </a:t>
+            </a:r>
+            <a:r>
+              <a:rPr lang="de-DE" dirty="0" smtClean="0"/>
+              <a:t>Das Rennen</a:t>
             </a:r>
             <a:endParaRPr lang="de-DE" dirty="0"/>
           </a:p>
@@ -3016,15 +3022,7 @@
           <a:p>
             <a:r>
               <a:rPr lang="de-DE" dirty="0" smtClean="0"/>
-              <a:t>Ludwig Lot, </a:t>
-            </a:r>
-            <a:r>
-              <a:rPr lang="de-DE" dirty="0" smtClean="0"/>
-              <a:t>Markus </a:t>
-            </a:r>
-            <a:r>
-              <a:rPr lang="de-DE" dirty="0" smtClean="0"/>
-              <a:t>Wiegand, Nils Jahnel, Sven </a:t>
+              <a:t>Ludwig Lot, Markus Wiegand, Nils Jahnel, Sven </a:t>
             </a:r>
             <a:r>
               <a:rPr lang="de-DE" dirty="0" err="1" smtClean="0"/>
@@ -3038,6 +3036,112 @@
     <p:extLst>
       <p:ext uri="{BB962C8B-B14F-4D97-AF65-F5344CB8AC3E}">
         <p14:creationId xmlns:p14="http://schemas.microsoft.com/office/powerpoint/2010/main" val="1663846402"/>
+      </p:ext>
+    </p:extLst>
+  </p:cSld>
+  <p:clrMapOvr>
+    <a:masterClrMapping/>
+  </p:clrMapOvr>
+  <p:timing>
+    <p:tnLst>
+      <p:par>
+        <p:cTn id="1" dur="indefinite" restart="never" nodeType="tmRoot"/>
+      </p:par>
+    </p:tnLst>
+  </p:timing>
+</p:sld>
+</file>
+
+<file path=ppt/slides/slide10.xml><?xml version="1.0" encoding="utf-8"?>
+<p:sld xmlns:a="http://schemas.openxmlformats.org/drawingml/2006/main" xmlns:r="http://schemas.openxmlformats.org/officeDocument/2006/relationships" xmlns:p="http://schemas.openxmlformats.org/presentationml/2006/main">
+  <p:cSld>
+    <p:spTree>
+      <p:nvGrpSpPr>
+        <p:cNvPr id="1" name=""/>
+        <p:cNvGrpSpPr/>
+        <p:nvPr/>
+      </p:nvGrpSpPr>
+      <p:grpSpPr>
+        <a:xfrm>
+          <a:off x="0" y="0"/>
+          <a:ext cx="0" cy="0"/>
+          <a:chOff x="0" y="0"/>
+          <a:chExt cx="0" cy="0"/>
+        </a:xfrm>
+      </p:grpSpPr>
+      <p:sp>
+        <p:nvSpPr>
+          <p:cNvPr id="2" name="Titel 1"/>
+          <p:cNvSpPr>
+            <a:spLocks noGrp="1"/>
+          </p:cNvSpPr>
+          <p:nvPr>
+            <p:ph type="title"/>
+          </p:nvPr>
+        </p:nvSpPr>
+        <p:spPr/>
+        <p:txBody>
+          <a:bodyPr/>
+          <a:lstStyle/>
+          <a:p>
+            <a:r>
+              <a:rPr lang="de-DE" dirty="0" smtClean="0"/>
+              <a:t>Das Größte Risiko</a:t>
+            </a:r>
+            <a:endParaRPr lang="de-DE" dirty="0"/>
+          </a:p>
+        </p:txBody>
+      </p:sp>
+      <p:sp>
+        <p:nvSpPr>
+          <p:cNvPr id="3" name="Inhaltsplatzhalter 2"/>
+          <p:cNvSpPr>
+            <a:spLocks noGrp="1"/>
+          </p:cNvSpPr>
+          <p:nvPr>
+            <p:ph idx="1"/>
+          </p:nvPr>
+        </p:nvSpPr>
+        <p:spPr/>
+        <p:txBody>
+          <a:bodyPr/>
+          <a:lstStyle/>
+          <a:p>
+            <a:r>
+              <a:rPr lang="de-DE" dirty="0" smtClean="0"/>
+              <a:t>Wir schaffen es nicht fertig zu werden.</a:t>
+            </a:r>
+          </a:p>
+          <a:p>
+            <a:r>
+              <a:rPr lang="de-DE" dirty="0" smtClean="0"/>
+              <a:t>Technik zu komplex</a:t>
+            </a:r>
+          </a:p>
+          <a:p>
+            <a:r>
+              <a:rPr lang="de-DE" dirty="0" smtClean="0"/>
+              <a:t>Meilensteine nicht kompatibel zu einander</a:t>
+            </a:r>
+          </a:p>
+          <a:p>
+            <a:endParaRPr lang="de-DE" dirty="0"/>
+          </a:p>
+          <a:p>
+            <a:r>
+              <a:rPr lang="de-DE" dirty="0" smtClean="0"/>
+              <a:t>Klausur nicht bestanden!</a:t>
+            </a:r>
+          </a:p>
+          <a:p>
+            <a:endParaRPr lang="de-DE" dirty="0"/>
+          </a:p>
+        </p:txBody>
+      </p:sp>
+    </p:spTree>
+    <p:extLst>
+      <p:ext uri="{BB962C8B-B14F-4D97-AF65-F5344CB8AC3E}">
+        <p14:creationId xmlns:p14="http://schemas.microsoft.com/office/powerpoint/2010/main" val="348422680"/>
       </p:ext>
     </p:extLst>
   </p:cSld>
@@ -3556,7 +3660,11 @@
           <a:bodyPr/>
           <a:lstStyle/>
           <a:p>
-            <a:endParaRPr lang="de-DE"/>
+            <a:r>
+              <a:rPr lang="de-DE" dirty="0" smtClean="0"/>
+              <a:t>Work in Progress</a:t>
+            </a:r>
+            <a:endParaRPr lang="de-DE" dirty="0"/>
           </a:p>
         </p:txBody>
       </p:sp>
@@ -3614,31 +3722,396 @@
           <a:p>
             <a:r>
               <a:rPr lang="de-DE" dirty="0" smtClean="0"/>
-              <a:t>Zeitplan</a:t>
+              <a:t>Zeitplan (Meilenstein 1 – 2)</a:t>
             </a:r>
             <a:endParaRPr lang="de-DE" dirty="0"/>
           </a:p>
         </p:txBody>
       </p:sp>
-      <p:sp>
-        <p:nvSpPr>
-          <p:cNvPr id="3" name="Inhaltsplatzhalter 2"/>
-          <p:cNvSpPr>
-            <a:spLocks noGrp="1"/>
-          </p:cNvSpPr>
+      <p:graphicFrame>
+        <p:nvGraphicFramePr>
+          <p:cNvPr id="4" name="Inhaltsplatzhalter 3"/>
+          <p:cNvGraphicFramePr>
+            <a:graphicFrameLocks noGrp="1"/>
+          </p:cNvGraphicFramePr>
           <p:nvPr>
             <p:ph idx="1"/>
-          </p:nvPr>
-        </p:nvSpPr>
-        <p:spPr/>
-        <p:txBody>
-          <a:bodyPr/>
-          <a:lstStyle/>
-          <a:p>
-            <a:endParaRPr lang="de-DE"/>
-          </a:p>
-        </p:txBody>
-      </p:sp>
+            <p:extLst>
+              <p:ext uri="{D42A27DB-BD31-4B8C-83A1-F6EECF244321}">
+                <p14:modId xmlns:p14="http://schemas.microsoft.com/office/powerpoint/2010/main" val="2150302261"/>
+              </p:ext>
+            </p:extLst>
+          </p:nvPr>
+        </p:nvGraphicFramePr>
+        <p:xfrm>
+          <a:off x="838200" y="1509939"/>
+          <a:ext cx="10515600" cy="4348480"/>
+        </p:xfrm>
+        <a:graphic>
+          <a:graphicData uri="http://schemas.openxmlformats.org/drawingml/2006/table">
+            <a:tbl>
+              <a:tblPr firstRow="1" bandRow="1">
+                <a:tableStyleId>{5C22544A-7EE6-4342-B048-85BDC9FD1C3A}</a:tableStyleId>
+              </a:tblPr>
+              <a:tblGrid>
+                <a:gridCol w="5257800"/>
+                <a:gridCol w="5257800"/>
+              </a:tblGrid>
+              <a:tr h="370840">
+                <a:tc>
+                  <a:txBody>
+                    <a:bodyPr/>
+                    <a:lstStyle/>
+                    <a:p>
+                      <a:r>
+                        <a:rPr lang="de-DE" dirty="0" smtClean="0"/>
+                        <a:t>Aufgaben</a:t>
+                      </a:r>
+                      <a:endParaRPr lang="de-DE" dirty="0"/>
+                    </a:p>
+                  </a:txBody>
+                  <a:tcPr/>
+                </a:tc>
+                <a:tc>
+                  <a:txBody>
+                    <a:bodyPr/>
+                    <a:lstStyle/>
+                    <a:p>
+                      <a:r>
+                        <a:rPr lang="de-DE" dirty="0" smtClean="0"/>
+                        <a:t>Geplante Zeit</a:t>
+                      </a:r>
+                      <a:endParaRPr lang="de-DE" dirty="0"/>
+                    </a:p>
+                  </a:txBody>
+                  <a:tcPr/>
+                </a:tc>
+              </a:tr>
+              <a:tr h="370840">
+                <a:tc>
+                  <a:txBody>
+                    <a:bodyPr/>
+                    <a:lstStyle/>
+                    <a:p>
+                      <a:r>
+                        <a:rPr lang="de-DE" dirty="0" smtClean="0"/>
+                        <a:t>Treffen</a:t>
+                      </a:r>
+                      <a:r>
+                        <a:rPr lang="de-DE" baseline="0" dirty="0" smtClean="0"/>
+                        <a:t> zur Aufgabenverteilung</a:t>
+                      </a:r>
+                      <a:endParaRPr lang="de-DE" dirty="0"/>
+                    </a:p>
+                  </a:txBody>
+                  <a:tcPr/>
+                </a:tc>
+                <a:tc>
+                  <a:txBody>
+                    <a:bodyPr/>
+                    <a:lstStyle/>
+                    <a:p>
+                      <a:r>
+                        <a:rPr lang="de-DE" dirty="0" smtClean="0"/>
+                        <a:t>2h</a:t>
+                      </a:r>
+                    </a:p>
+                  </a:txBody>
+                  <a:tcPr/>
+                </a:tc>
+              </a:tr>
+              <a:tr h="370840">
+                <a:tc>
+                  <a:txBody>
+                    <a:bodyPr/>
+                    <a:lstStyle/>
+                    <a:p>
+                      <a:r>
+                        <a:rPr lang="de-DE" dirty="0" smtClean="0"/>
+                        <a:t>Design</a:t>
+                      </a:r>
+                      <a:r>
+                        <a:rPr lang="de-DE" baseline="0" dirty="0" smtClean="0"/>
+                        <a:t> der ersten Strecke</a:t>
+                      </a:r>
+                      <a:endParaRPr lang="de-DE" dirty="0"/>
+                    </a:p>
+                  </a:txBody>
+                  <a:tcPr/>
+                </a:tc>
+                <a:tc>
+                  <a:txBody>
+                    <a:bodyPr/>
+                    <a:lstStyle/>
+                    <a:p>
+                      <a:r>
+                        <a:rPr lang="de-DE" dirty="0" smtClean="0"/>
+                        <a:t>2h</a:t>
+                      </a:r>
+                      <a:endParaRPr lang="de-DE" dirty="0"/>
+                    </a:p>
+                  </a:txBody>
+                  <a:tcPr/>
+                </a:tc>
+              </a:tr>
+              <a:tr h="370840">
+                <a:tc>
+                  <a:txBody>
+                    <a:bodyPr/>
+                    <a:lstStyle/>
+                    <a:p>
+                      <a:r>
+                        <a:rPr lang="de-DE" dirty="0" smtClean="0"/>
+                        <a:t>Grobe</a:t>
+                      </a:r>
+                      <a:r>
+                        <a:rPr lang="de-DE" baseline="0" dirty="0" smtClean="0"/>
+                        <a:t> Modellumsetzung der ersten Strecke</a:t>
+                      </a:r>
+                      <a:endParaRPr lang="de-DE" dirty="0"/>
+                    </a:p>
+                  </a:txBody>
+                  <a:tcPr/>
+                </a:tc>
+                <a:tc>
+                  <a:txBody>
+                    <a:bodyPr/>
+                    <a:lstStyle/>
+                    <a:p>
+                      <a:r>
+                        <a:rPr lang="de-DE" dirty="0" smtClean="0"/>
+                        <a:t>5h</a:t>
+                      </a:r>
+                      <a:endParaRPr lang="de-DE" dirty="0"/>
+                    </a:p>
+                  </a:txBody>
+                  <a:tcPr/>
+                </a:tc>
+              </a:tr>
+              <a:tr h="370840">
+                <a:tc>
+                  <a:txBody>
+                    <a:bodyPr/>
+                    <a:lstStyle/>
+                    <a:p>
+                      <a:r>
+                        <a:rPr lang="de-DE" dirty="0" smtClean="0"/>
+                        <a:t>Funktionen:</a:t>
+                      </a:r>
+                      <a:r>
+                        <a:rPr lang="de-DE" baseline="0" dirty="0" smtClean="0"/>
+                        <a:t> Kollisionsabfrage etc.</a:t>
+                      </a:r>
+                      <a:endParaRPr lang="de-DE" dirty="0"/>
+                    </a:p>
+                  </a:txBody>
+                  <a:tcPr/>
+                </a:tc>
+                <a:tc>
+                  <a:txBody>
+                    <a:bodyPr/>
+                    <a:lstStyle/>
+                    <a:p>
+                      <a:r>
+                        <a:rPr lang="de-DE" dirty="0" smtClean="0"/>
+                        <a:t>26h</a:t>
+                      </a:r>
+                      <a:endParaRPr lang="de-DE" dirty="0"/>
+                    </a:p>
+                  </a:txBody>
+                  <a:tcPr/>
+                </a:tc>
+              </a:tr>
+              <a:tr h="370840">
+                <a:tc>
+                  <a:txBody>
+                    <a:bodyPr/>
+                    <a:lstStyle/>
+                    <a:p>
+                      <a:r>
+                        <a:rPr lang="de-DE" dirty="0" smtClean="0"/>
+                        <a:t>1. Code-Optimierung</a:t>
+                      </a:r>
+                      <a:endParaRPr lang="de-DE" dirty="0"/>
+                    </a:p>
+                  </a:txBody>
+                  <a:tcPr/>
+                </a:tc>
+                <a:tc>
+                  <a:txBody>
+                    <a:bodyPr/>
+                    <a:lstStyle/>
+                    <a:p>
+                      <a:r>
+                        <a:rPr lang="de-DE" dirty="0" smtClean="0"/>
+                        <a:t>3h</a:t>
+                      </a:r>
+                      <a:endParaRPr lang="de-DE" dirty="0"/>
+                    </a:p>
+                  </a:txBody>
+                  <a:tcPr/>
+                </a:tc>
+              </a:tr>
+              <a:tr h="370840">
+                <a:tc>
+                  <a:txBody>
+                    <a:bodyPr/>
+                    <a:lstStyle/>
+                    <a:p>
+                      <a:r>
+                        <a:rPr lang="de-DE" dirty="0" smtClean="0"/>
+                        <a:t>Fortgeschrittene</a:t>
+                      </a:r>
+                      <a:r>
+                        <a:rPr lang="de-DE" baseline="0" dirty="0" smtClean="0"/>
+                        <a:t> Modellierung </a:t>
+                      </a:r>
+                    </a:p>
+                    <a:p>
+                      <a:r>
+                        <a:rPr lang="de-DE" baseline="0" dirty="0" smtClean="0"/>
+                        <a:t>(Auto &amp; Streckenlandschaft)</a:t>
+                      </a:r>
+                      <a:endParaRPr lang="de-DE" dirty="0"/>
+                    </a:p>
+                  </a:txBody>
+                  <a:tcPr/>
+                </a:tc>
+                <a:tc>
+                  <a:txBody>
+                    <a:bodyPr/>
+                    <a:lstStyle/>
+                    <a:p>
+                      <a:r>
+                        <a:rPr lang="de-DE" dirty="0" smtClean="0"/>
+                        <a:t>20 h</a:t>
+                      </a:r>
+                      <a:endParaRPr lang="de-DE" dirty="0"/>
+                    </a:p>
+                  </a:txBody>
+                  <a:tcPr/>
+                </a:tc>
+              </a:tr>
+              <a:tr h="370840">
+                <a:tc>
+                  <a:txBody>
+                    <a:bodyPr/>
+                    <a:lstStyle/>
+                    <a:p>
+                      <a:r>
+                        <a:rPr lang="de-DE" dirty="0" smtClean="0"/>
+                        <a:t>2.</a:t>
+                      </a:r>
+                      <a:r>
+                        <a:rPr lang="de-DE" baseline="0" dirty="0" smtClean="0"/>
+                        <a:t> Code Optimierung</a:t>
+                      </a:r>
+                      <a:endParaRPr lang="de-DE" dirty="0"/>
+                    </a:p>
+                  </a:txBody>
+                  <a:tcPr/>
+                </a:tc>
+                <a:tc>
+                  <a:txBody>
+                    <a:bodyPr/>
+                    <a:lstStyle/>
+                    <a:p>
+                      <a:r>
+                        <a:rPr lang="de-DE" dirty="0" smtClean="0"/>
+                        <a:t>3h</a:t>
+                      </a:r>
+                      <a:endParaRPr lang="de-DE" dirty="0"/>
+                    </a:p>
+                  </a:txBody>
+                  <a:tcPr/>
+                </a:tc>
+              </a:tr>
+              <a:tr h="370840">
+                <a:tc>
+                  <a:txBody>
+                    <a:bodyPr/>
+                    <a:lstStyle/>
+                    <a:p>
+                      <a:r>
+                        <a:rPr lang="de-DE" dirty="0" smtClean="0"/>
+                        <a:t>Ausprobieren/Testen</a:t>
+                      </a:r>
+                      <a:endParaRPr lang="de-DE" dirty="0"/>
+                    </a:p>
+                  </a:txBody>
+                  <a:tcPr/>
+                </a:tc>
+                <a:tc>
+                  <a:txBody>
+                    <a:bodyPr/>
+                    <a:lstStyle/>
+                    <a:p>
+                      <a:r>
+                        <a:rPr lang="de-DE" dirty="0" smtClean="0"/>
+                        <a:t>10h</a:t>
+                      </a:r>
+                      <a:endParaRPr lang="de-DE" dirty="0"/>
+                    </a:p>
+                  </a:txBody>
+                  <a:tcPr/>
+                </a:tc>
+              </a:tr>
+              <a:tr h="370840">
+                <a:tc>
+                  <a:txBody>
+                    <a:bodyPr/>
+                    <a:lstStyle/>
+                    <a:p>
+                      <a:endParaRPr lang="de-DE" dirty="0"/>
+                    </a:p>
+                  </a:txBody>
+                  <a:tcPr/>
+                </a:tc>
+                <a:tc>
+                  <a:txBody>
+                    <a:bodyPr/>
+                    <a:lstStyle/>
+                    <a:p>
+                      <a:endParaRPr lang="de-DE" dirty="0"/>
+                    </a:p>
+                  </a:txBody>
+                  <a:tcPr/>
+                </a:tc>
+              </a:tr>
+              <a:tr h="370840">
+                <a:tc>
+                  <a:txBody>
+                    <a:bodyPr/>
+                    <a:lstStyle/>
+                    <a:p>
+                      <a:r>
+                        <a:rPr lang="de-DE" dirty="0" smtClean="0"/>
+                        <a:t>Finale Präsentation vorbereiten</a:t>
+                      </a:r>
+                      <a:endParaRPr lang="de-DE" dirty="0"/>
+                    </a:p>
+                  </a:txBody>
+                  <a:tcPr/>
+                </a:tc>
+                <a:tc>
+                  <a:txBody>
+                    <a:bodyPr/>
+                    <a:lstStyle/>
+                    <a:p>
+                      <a:r>
+                        <a:rPr lang="de-DE" dirty="0" smtClean="0"/>
+                        <a:t>4h</a:t>
+                      </a:r>
+                      <a:endParaRPr lang="de-DE" dirty="0"/>
+                    </a:p>
+                  </a:txBody>
+                  <a:tcPr/>
+                </a:tc>
+              </a:tr>
+            </a:tbl>
+          </a:graphicData>
+        </a:graphic>
+      </p:graphicFrame>
     </p:spTree>
     <p:extLst>
       <p:ext uri="{BB962C8B-B14F-4D97-AF65-F5344CB8AC3E}">
@@ -3693,35 +4166,440 @@
           <a:p>
             <a:r>
               <a:rPr lang="de-DE" dirty="0" smtClean="0"/>
-              <a:t>Meilensteine</a:t>
+              <a:t>Zeitplan (Meilenstein 3 – Der Bonus)</a:t>
             </a:r>
             <a:endParaRPr lang="de-DE" dirty="0"/>
           </a:p>
         </p:txBody>
       </p:sp>
-      <p:sp>
-        <p:nvSpPr>
-          <p:cNvPr id="3" name="Inhaltsplatzhalter 2"/>
-          <p:cNvSpPr>
-            <a:spLocks noGrp="1"/>
-          </p:cNvSpPr>
+      <p:graphicFrame>
+        <p:nvGraphicFramePr>
+          <p:cNvPr id="4" name="Inhaltsplatzhalter 3"/>
+          <p:cNvGraphicFramePr>
+            <a:graphicFrameLocks noGrp="1"/>
+          </p:cNvGraphicFramePr>
           <p:nvPr>
             <p:ph idx="1"/>
-          </p:nvPr>
-        </p:nvSpPr>
-        <p:spPr/>
-        <p:txBody>
-          <a:bodyPr/>
-          <a:lstStyle/>
-          <a:p>
-            <a:endParaRPr lang="de-DE"/>
-          </a:p>
-        </p:txBody>
-      </p:sp>
+            <p:extLst>
+              <p:ext uri="{D42A27DB-BD31-4B8C-83A1-F6EECF244321}">
+                <p14:modId xmlns:p14="http://schemas.microsoft.com/office/powerpoint/2010/main" val="3228483979"/>
+              </p:ext>
+            </p:extLst>
+          </p:nvPr>
+        </p:nvGraphicFramePr>
+        <p:xfrm>
+          <a:off x="838200" y="1509939"/>
+          <a:ext cx="10515600" cy="4719320"/>
+        </p:xfrm>
+        <a:graphic>
+          <a:graphicData uri="http://schemas.openxmlformats.org/drawingml/2006/table">
+            <a:tbl>
+              <a:tblPr firstRow="1" bandRow="1">
+                <a:tableStyleId>{5C22544A-7EE6-4342-B048-85BDC9FD1C3A}</a:tableStyleId>
+              </a:tblPr>
+              <a:tblGrid>
+                <a:gridCol w="5257800"/>
+                <a:gridCol w="5257800"/>
+              </a:tblGrid>
+              <a:tr h="370840">
+                <a:tc>
+                  <a:txBody>
+                    <a:bodyPr/>
+                    <a:lstStyle/>
+                    <a:p>
+                      <a:r>
+                        <a:rPr lang="de-DE" dirty="0" smtClean="0"/>
+                        <a:t>Aufgaben</a:t>
+                      </a:r>
+                      <a:endParaRPr lang="de-DE" dirty="0"/>
+                    </a:p>
+                  </a:txBody>
+                  <a:tcPr/>
+                </a:tc>
+                <a:tc>
+                  <a:txBody>
+                    <a:bodyPr/>
+                    <a:lstStyle/>
+                    <a:p>
+                      <a:r>
+                        <a:rPr lang="de-DE" dirty="0" smtClean="0"/>
+                        <a:t>Geplante Zeit</a:t>
+                      </a:r>
+                      <a:endParaRPr lang="de-DE" dirty="0"/>
+                    </a:p>
+                  </a:txBody>
+                  <a:tcPr/>
+                </a:tc>
+              </a:tr>
+              <a:tr h="370840">
+                <a:tc>
+                  <a:txBody>
+                    <a:bodyPr/>
+                    <a:lstStyle/>
+                    <a:p>
+                      <a:r>
+                        <a:rPr lang="de-DE" dirty="0" smtClean="0"/>
+                        <a:t>Design</a:t>
+                      </a:r>
+                      <a:r>
+                        <a:rPr lang="de-DE" baseline="0" dirty="0" smtClean="0"/>
+                        <a:t> von alternativen Farben</a:t>
+                      </a:r>
+                      <a:endParaRPr lang="de-DE" dirty="0"/>
+                    </a:p>
+                  </a:txBody>
+                  <a:tcPr/>
+                </a:tc>
+                <a:tc>
+                  <a:txBody>
+                    <a:bodyPr/>
+                    <a:lstStyle/>
+                    <a:p>
+                      <a:r>
+                        <a:rPr lang="de-DE" dirty="0" smtClean="0"/>
+                        <a:t>2h</a:t>
+                      </a:r>
+                    </a:p>
+                  </a:txBody>
+                  <a:tcPr/>
+                </a:tc>
+              </a:tr>
+              <a:tr h="370840">
+                <a:tc>
+                  <a:txBody>
+                    <a:bodyPr/>
+                    <a:lstStyle/>
+                    <a:p>
+                      <a:r>
+                        <a:rPr lang="de-DE" dirty="0" smtClean="0"/>
+                        <a:t>Design</a:t>
+                      </a:r>
+                      <a:r>
+                        <a:rPr lang="de-DE" baseline="0" dirty="0" smtClean="0"/>
+                        <a:t> der Editor GUI</a:t>
+                      </a:r>
+                      <a:endParaRPr lang="de-DE" dirty="0"/>
+                    </a:p>
+                  </a:txBody>
+                  <a:tcPr/>
+                </a:tc>
+                <a:tc>
+                  <a:txBody>
+                    <a:bodyPr/>
+                    <a:lstStyle/>
+                    <a:p>
+                      <a:r>
+                        <a:rPr lang="de-DE" dirty="0" smtClean="0"/>
+                        <a:t>2h</a:t>
+                      </a:r>
+                      <a:endParaRPr lang="de-DE" dirty="0"/>
+                    </a:p>
+                  </a:txBody>
+                  <a:tcPr/>
+                </a:tc>
+              </a:tr>
+              <a:tr h="370840">
+                <a:tc>
+                  <a:txBody>
+                    <a:bodyPr/>
+                    <a:lstStyle/>
+                    <a:p>
+                      <a:r>
+                        <a:rPr lang="de-DE" dirty="0" smtClean="0"/>
+                        <a:t>Umsetzung der Editor GUI</a:t>
+                      </a:r>
+                      <a:endParaRPr lang="de-DE" dirty="0"/>
+                    </a:p>
+                  </a:txBody>
+                  <a:tcPr/>
+                </a:tc>
+                <a:tc>
+                  <a:txBody>
+                    <a:bodyPr/>
+                    <a:lstStyle/>
+                    <a:p>
+                      <a:r>
+                        <a:rPr lang="de-DE" dirty="0" smtClean="0"/>
+                        <a:t>30</a:t>
+                      </a:r>
+                      <a:r>
+                        <a:rPr lang="de-DE" baseline="0" dirty="0" smtClean="0"/>
+                        <a:t> h</a:t>
+                      </a:r>
+                      <a:endParaRPr lang="de-DE" dirty="0"/>
+                    </a:p>
+                  </a:txBody>
+                  <a:tcPr/>
+                </a:tc>
+              </a:tr>
+              <a:tr h="370840">
+                <a:tc>
+                  <a:txBody>
+                    <a:bodyPr/>
+                    <a:lstStyle/>
+                    <a:p>
+                      <a:r>
+                        <a:rPr lang="de-DE" dirty="0" smtClean="0"/>
+                        <a:t>Funktionen:</a:t>
+                      </a:r>
+                      <a:r>
+                        <a:rPr lang="de-DE" baseline="0" dirty="0" smtClean="0"/>
+                        <a:t> </a:t>
+                      </a:r>
+                      <a:r>
+                        <a:rPr lang="de-DE" baseline="0" dirty="0" err="1" smtClean="0"/>
+                        <a:t>Palletenauswahl</a:t>
+                      </a:r>
+                      <a:r>
+                        <a:rPr lang="de-DE" baseline="0" dirty="0" smtClean="0"/>
+                        <a:t>, Farbübernahme etc.</a:t>
+                      </a:r>
+                      <a:endParaRPr lang="de-DE" dirty="0"/>
+                    </a:p>
+                  </a:txBody>
+                  <a:tcPr/>
+                </a:tc>
+                <a:tc>
+                  <a:txBody>
+                    <a:bodyPr/>
+                    <a:lstStyle/>
+                    <a:p>
+                      <a:r>
+                        <a:rPr lang="de-DE" dirty="0" smtClean="0"/>
+                        <a:t>30h</a:t>
+                      </a:r>
+                      <a:endParaRPr lang="de-DE" dirty="0"/>
+                    </a:p>
+                  </a:txBody>
+                  <a:tcPr/>
+                </a:tc>
+              </a:tr>
+              <a:tr h="370840">
+                <a:tc>
+                  <a:txBody>
+                    <a:bodyPr/>
+                    <a:lstStyle/>
+                    <a:p>
+                      <a:r>
+                        <a:rPr lang="de-DE" dirty="0" smtClean="0"/>
+                        <a:t>1. Code-Optimierung</a:t>
+                      </a:r>
+                      <a:endParaRPr lang="de-DE" dirty="0"/>
+                    </a:p>
+                  </a:txBody>
+                  <a:tcPr/>
+                </a:tc>
+                <a:tc>
+                  <a:txBody>
+                    <a:bodyPr/>
+                    <a:lstStyle/>
+                    <a:p>
+                      <a:r>
+                        <a:rPr lang="de-DE" dirty="0" smtClean="0"/>
+                        <a:t>3h</a:t>
+                      </a:r>
+                      <a:endParaRPr lang="de-DE" dirty="0"/>
+                    </a:p>
+                  </a:txBody>
+                  <a:tcPr/>
+                </a:tc>
+              </a:tr>
+              <a:tr h="370840">
+                <a:tc>
+                  <a:txBody>
+                    <a:bodyPr/>
+                    <a:lstStyle/>
+                    <a:p>
+                      <a:r>
+                        <a:rPr lang="de-DE" dirty="0" smtClean="0"/>
+                        <a:t>Design alternativer</a:t>
+                      </a:r>
+                      <a:r>
+                        <a:rPr lang="de-DE" baseline="0" dirty="0" smtClean="0"/>
+                        <a:t> Automodelle</a:t>
+                      </a:r>
+                      <a:endParaRPr lang="de-DE" dirty="0"/>
+                    </a:p>
+                  </a:txBody>
+                  <a:tcPr/>
+                </a:tc>
+                <a:tc>
+                  <a:txBody>
+                    <a:bodyPr/>
+                    <a:lstStyle/>
+                    <a:p>
+                      <a:r>
+                        <a:rPr lang="de-DE" dirty="0" smtClean="0"/>
+                        <a:t>2h</a:t>
+                      </a:r>
+                      <a:endParaRPr lang="de-DE" dirty="0"/>
+                    </a:p>
+                  </a:txBody>
+                  <a:tcPr/>
+                </a:tc>
+              </a:tr>
+              <a:tr h="370840">
+                <a:tc>
+                  <a:txBody>
+                    <a:bodyPr/>
+                    <a:lstStyle/>
+                    <a:p>
+                      <a:r>
+                        <a:rPr lang="de-DE" dirty="0" smtClean="0"/>
+                        <a:t>Funktionen: Modellübernahme</a:t>
+                      </a:r>
+                      <a:r>
+                        <a:rPr lang="de-DE" baseline="0" dirty="0" smtClean="0"/>
+                        <a:t>, neue </a:t>
+                      </a:r>
+                      <a:r>
+                        <a:rPr lang="de-DE" baseline="0" dirty="0" err="1" smtClean="0"/>
+                        <a:t>Kollisionenberechnung</a:t>
+                      </a:r>
+                      <a:r>
+                        <a:rPr lang="de-DE" baseline="0" dirty="0" smtClean="0"/>
+                        <a:t> etc.</a:t>
+                      </a:r>
+                      <a:endParaRPr lang="de-DE" dirty="0"/>
+                    </a:p>
+                  </a:txBody>
+                  <a:tcPr/>
+                </a:tc>
+                <a:tc>
+                  <a:txBody>
+                    <a:bodyPr/>
+                    <a:lstStyle/>
+                    <a:p>
+                      <a:r>
+                        <a:rPr lang="de-DE" dirty="0" smtClean="0"/>
+                        <a:t>35h</a:t>
+                      </a:r>
+                      <a:endParaRPr lang="de-DE" dirty="0"/>
+                    </a:p>
+                  </a:txBody>
+                  <a:tcPr/>
+                </a:tc>
+              </a:tr>
+              <a:tr h="370840">
+                <a:tc>
+                  <a:txBody>
+                    <a:bodyPr/>
+                    <a:lstStyle/>
+                    <a:p>
+                      <a:r>
+                        <a:rPr lang="de-DE" dirty="0" smtClean="0"/>
+                        <a:t>2. Code-Optimierung</a:t>
+                      </a:r>
+                      <a:endParaRPr lang="de-DE" dirty="0"/>
+                    </a:p>
+                  </a:txBody>
+                  <a:tcPr/>
+                </a:tc>
+                <a:tc>
+                  <a:txBody>
+                    <a:bodyPr/>
+                    <a:lstStyle/>
+                    <a:p>
+                      <a:r>
+                        <a:rPr lang="de-DE" dirty="0" smtClean="0"/>
+                        <a:t>3h</a:t>
+                      </a:r>
+                      <a:endParaRPr lang="de-DE" dirty="0"/>
+                    </a:p>
+                  </a:txBody>
+                  <a:tcPr/>
+                </a:tc>
+              </a:tr>
+              <a:tr h="370840">
+                <a:tc>
+                  <a:txBody>
+                    <a:bodyPr/>
+                    <a:lstStyle/>
+                    <a:p>
+                      <a:r>
+                        <a:rPr lang="de-DE" dirty="0" smtClean="0"/>
+                        <a:t>Ausprobieren/Testen</a:t>
+                      </a:r>
+                      <a:endParaRPr lang="de-DE" dirty="0"/>
+                    </a:p>
+                  </a:txBody>
+                  <a:tcPr/>
+                </a:tc>
+                <a:tc>
+                  <a:txBody>
+                    <a:bodyPr/>
+                    <a:lstStyle/>
+                    <a:p>
+                      <a:r>
+                        <a:rPr lang="de-DE" dirty="0" smtClean="0"/>
+                        <a:t>10h</a:t>
+                      </a:r>
+                      <a:endParaRPr lang="de-DE" dirty="0"/>
+                    </a:p>
+                  </a:txBody>
+                  <a:tcPr/>
+                </a:tc>
+              </a:tr>
+              <a:tr h="370840">
+                <a:tc>
+                  <a:txBody>
+                    <a:bodyPr/>
+                    <a:lstStyle/>
+                    <a:p>
+                      <a:endParaRPr lang="de-DE" dirty="0"/>
+                    </a:p>
+                  </a:txBody>
+                  <a:tcPr/>
+                </a:tc>
+                <a:tc>
+                  <a:txBody>
+                    <a:bodyPr/>
+                    <a:lstStyle/>
+                    <a:p>
+                      <a:endParaRPr lang="de-DE" dirty="0"/>
+                    </a:p>
+                  </a:txBody>
+                  <a:tcPr/>
+                </a:tc>
+              </a:tr>
+              <a:tr h="370840">
+                <a:tc>
+                  <a:txBody>
+                    <a:bodyPr/>
+                    <a:lstStyle/>
+                    <a:p>
+                      <a:r>
+                        <a:rPr lang="de-DE" dirty="0" smtClean="0"/>
+                        <a:t>Finale Präsentation vorbereiten</a:t>
+                      </a:r>
+                      <a:endParaRPr lang="de-DE" dirty="0"/>
+                    </a:p>
+                  </a:txBody>
+                  <a:tcPr/>
+                </a:tc>
+                <a:tc>
+                  <a:txBody>
+                    <a:bodyPr/>
+                    <a:lstStyle/>
+                    <a:p>
+                      <a:r>
+                        <a:rPr lang="de-DE" dirty="0" smtClean="0"/>
+                        <a:t>3h</a:t>
+                      </a:r>
+                      <a:endParaRPr lang="de-DE" dirty="0"/>
+                    </a:p>
+                  </a:txBody>
+                  <a:tcPr/>
+                </a:tc>
+              </a:tr>
+            </a:tbl>
+          </a:graphicData>
+        </a:graphic>
+      </p:graphicFrame>
     </p:spTree>
     <p:extLst>
       <p:ext uri="{BB962C8B-B14F-4D97-AF65-F5344CB8AC3E}">
-        <p14:creationId xmlns:p14="http://schemas.microsoft.com/office/powerpoint/2010/main" val="1770962220"/>
+        <p14:creationId xmlns:p14="http://schemas.microsoft.com/office/powerpoint/2010/main" val="387332274"/>
       </p:ext>
     </p:extLst>
   </p:cSld>
@@ -3772,7 +4650,7 @@
           <a:p>
             <a:r>
               <a:rPr lang="de-DE" dirty="0" smtClean="0"/>
-              <a:t>Das Größte Risiko</a:t>
+              <a:t>Meilensteine</a:t>
             </a:r>
             <a:endParaRPr lang="de-DE" dirty="0"/>
           </a:p>
@@ -3793,14 +4671,244 @@
           <a:bodyPr/>
           <a:lstStyle/>
           <a:p>
-            <a:endParaRPr lang="de-DE"/>
+            <a:r>
+              <a:rPr lang="de-DE" dirty="0"/>
+              <a:t>Unsere Strecke(n)</a:t>
+            </a:r>
+          </a:p>
+          <a:p>
+            <a:pPr lvl="1"/>
+            <a:r>
+              <a:rPr lang="de-DE" dirty="0" smtClean="0"/>
+              <a:t>Grundfunktion gewährleistet…</a:t>
+            </a:r>
+          </a:p>
+          <a:p>
+            <a:pPr lvl="1"/>
+            <a:r>
+              <a:rPr lang="de-DE" dirty="0" smtClean="0"/>
+              <a:t>Eine fertig Rennstrecke existent</a:t>
+            </a:r>
+          </a:p>
+          <a:p>
+            <a:pPr lvl="1"/>
+            <a:r>
+              <a:rPr lang="de-DE" dirty="0"/>
+              <a:t>K</a:t>
+            </a:r>
+            <a:r>
+              <a:rPr lang="de-DE" dirty="0" smtClean="0"/>
+              <a:t>ollisionen berücksichtigt</a:t>
+            </a:r>
+          </a:p>
+          <a:p>
+            <a:pPr lvl="1"/>
+            <a:endParaRPr lang="de-DE" dirty="0" smtClean="0"/>
+          </a:p>
+          <a:p>
+            <a:r>
+              <a:rPr lang="de-DE" dirty="0" smtClean="0"/>
+              <a:t>Die Modelle</a:t>
+            </a:r>
+          </a:p>
+          <a:p>
+            <a:pPr lvl="1"/>
+            <a:r>
+              <a:rPr lang="de-DE" dirty="0" smtClean="0"/>
+              <a:t>Offizielle Modelle für</a:t>
+            </a:r>
+            <a:r>
+              <a:rPr lang="de-DE" dirty="0"/>
+              <a:t> </a:t>
+            </a:r>
+            <a:r>
+              <a:rPr lang="de-DE" dirty="0" smtClean="0"/>
+              <a:t>das Auto und die Strecke an sich.</a:t>
+            </a:r>
+          </a:p>
+          <a:p>
+            <a:pPr lvl="1"/>
+            <a:r>
+              <a:rPr lang="de-DE" dirty="0" smtClean="0"/>
+              <a:t>Erste Texturierung</a:t>
+            </a:r>
+          </a:p>
+          <a:p>
+            <a:endParaRPr lang="de-DE" dirty="0"/>
           </a:p>
         </p:txBody>
       </p:sp>
     </p:spTree>
     <p:extLst>
       <p:ext uri="{BB962C8B-B14F-4D97-AF65-F5344CB8AC3E}">
-        <p14:creationId xmlns:p14="http://schemas.microsoft.com/office/powerpoint/2010/main" val="348422680"/>
+        <p14:creationId xmlns:p14="http://schemas.microsoft.com/office/powerpoint/2010/main" val="1770962220"/>
+      </p:ext>
+    </p:extLst>
+  </p:cSld>
+  <p:clrMapOvr>
+    <a:masterClrMapping/>
+  </p:clrMapOvr>
+  <p:timing>
+    <p:tnLst>
+      <p:par>
+        <p:cTn id="1" dur="indefinite" restart="never" nodeType="tmRoot"/>
+      </p:par>
+    </p:tnLst>
+  </p:timing>
+</p:sld>
+</file>
+
+<file path=ppt/slides/slide9.xml><?xml version="1.0" encoding="utf-8"?>
+<p:sld xmlns:a="http://schemas.openxmlformats.org/drawingml/2006/main" xmlns:r="http://schemas.openxmlformats.org/officeDocument/2006/relationships" xmlns:p="http://schemas.openxmlformats.org/presentationml/2006/main">
+  <p:cSld>
+    <p:spTree>
+      <p:nvGrpSpPr>
+        <p:cNvPr id="1" name=""/>
+        <p:cNvGrpSpPr/>
+        <p:nvPr/>
+      </p:nvGrpSpPr>
+      <p:grpSpPr>
+        <a:xfrm>
+          <a:off x="0" y="0"/>
+          <a:ext cx="0" cy="0"/>
+          <a:chOff x="0" y="0"/>
+          <a:chExt cx="0" cy="0"/>
+        </a:xfrm>
+      </p:grpSpPr>
+      <p:sp>
+        <p:nvSpPr>
+          <p:cNvPr id="2" name="Titel 1"/>
+          <p:cNvSpPr>
+            <a:spLocks noGrp="1"/>
+          </p:cNvSpPr>
+          <p:nvPr>
+            <p:ph type="title"/>
+          </p:nvPr>
+        </p:nvSpPr>
+        <p:spPr/>
+        <p:txBody>
+          <a:bodyPr/>
+          <a:lstStyle/>
+          <a:p>
+            <a:r>
+              <a:rPr lang="de-DE" dirty="0" smtClean="0"/>
+              <a:t>Meilensteine</a:t>
+            </a:r>
+            <a:endParaRPr lang="de-DE" dirty="0"/>
+          </a:p>
+        </p:txBody>
+      </p:sp>
+      <p:sp>
+        <p:nvSpPr>
+          <p:cNvPr id="3" name="Inhaltsplatzhalter 2"/>
+          <p:cNvSpPr>
+            <a:spLocks noGrp="1"/>
+          </p:cNvSpPr>
+          <p:nvPr>
+            <p:ph idx="1"/>
+          </p:nvPr>
+        </p:nvSpPr>
+        <p:spPr/>
+        <p:txBody>
+          <a:bodyPr/>
+          <a:lstStyle/>
+          <a:p>
+            <a:r>
+              <a:rPr lang="de-DE" dirty="0"/>
+              <a:t>Bonus: Ein </a:t>
+            </a:r>
+            <a:r>
+              <a:rPr lang="de-DE" dirty="0" smtClean="0"/>
+              <a:t>Auto-Editor</a:t>
+            </a:r>
+          </a:p>
+          <a:p>
+            <a:pPr lvl="1"/>
+            <a:r>
+              <a:rPr lang="de-DE" dirty="0" smtClean="0"/>
+              <a:t>Wenn noch Zeit bleibt!</a:t>
+            </a:r>
+          </a:p>
+          <a:p>
+            <a:pPr lvl="2"/>
+            <a:r>
+              <a:rPr lang="de-DE" dirty="0" smtClean="0"/>
+              <a:t>Vor dem eigentlichen Start des Rennens!</a:t>
+            </a:r>
+          </a:p>
+          <a:p>
+            <a:pPr lvl="2"/>
+            <a:r>
+              <a:rPr lang="de-DE" dirty="0" smtClean="0"/>
+              <a:t>Über </a:t>
+            </a:r>
+            <a:r>
+              <a:rPr lang="de-DE" dirty="0" err="1" smtClean="0"/>
+              <a:t>Farbpallete</a:t>
+            </a:r>
+            <a:r>
+              <a:rPr lang="de-DE" dirty="0" smtClean="0"/>
+              <a:t> das Aussehen des Autos ändern</a:t>
+            </a:r>
+          </a:p>
+          <a:p>
+            <a:pPr lvl="2"/>
+            <a:r>
+              <a:rPr lang="de-DE" dirty="0" smtClean="0"/>
+              <a:t>Über </a:t>
+            </a:r>
+            <a:r>
+              <a:rPr lang="de-DE" dirty="0" err="1" smtClean="0"/>
+              <a:t>Modellpallete</a:t>
+            </a:r>
+            <a:r>
+              <a:rPr lang="de-DE" dirty="0" smtClean="0"/>
+              <a:t> die Form des Autos ändern</a:t>
+            </a:r>
+          </a:p>
+          <a:p>
+            <a:pPr lvl="2"/>
+            <a:endParaRPr lang="de-DE" dirty="0" smtClean="0"/>
+          </a:p>
+          <a:p>
+            <a:pPr lvl="2"/>
+            <a:r>
+              <a:rPr lang="de-DE" dirty="0" smtClean="0"/>
+              <a:t>Evtl. auch Auswahl der Strecke selbst.</a:t>
+            </a:r>
+          </a:p>
+          <a:p>
+            <a:pPr lvl="3"/>
+            <a:r>
+              <a:rPr lang="de-DE" dirty="0" smtClean="0"/>
+              <a:t>(</a:t>
+            </a:r>
+            <a:r>
+              <a:rPr lang="de-DE" dirty="0" err="1" smtClean="0"/>
+              <a:t>Vorraussetzung</a:t>
+            </a:r>
+            <a:r>
+              <a:rPr lang="de-DE" dirty="0"/>
+              <a:t>:</a:t>
+            </a:r>
+            <a:r>
+              <a:rPr lang="de-DE" dirty="0" smtClean="0"/>
+              <a:t> Unterschiedliche Streckenmodelle)</a:t>
+            </a:r>
+            <a:endParaRPr lang="de-DE" dirty="0"/>
+          </a:p>
+          <a:p>
+            <a:endParaRPr lang="de-DE" dirty="0"/>
+          </a:p>
+          <a:p>
+            <a:endParaRPr lang="de-DE" dirty="0"/>
+          </a:p>
+        </p:txBody>
+      </p:sp>
+    </p:spTree>
+    <p:extLst>
+      <p:ext uri="{BB962C8B-B14F-4D97-AF65-F5344CB8AC3E}">
+        <p14:creationId xmlns:p14="http://schemas.microsoft.com/office/powerpoint/2010/main" val="3170582547"/>
       </p:ext>
     </p:extLst>
   </p:cSld>
@@ -4072,7 +5180,7 @@
   <a:extraClrSchemeLst/>
   <a:extLst>
     <a:ext uri="{05A4C25C-085E-4340-85A3-A5531E510DB2}">
-      <thm15:themeFamily xmlns="" xmlns:thm15="http://schemas.microsoft.com/office/thememl/2012/main" name="Office Theme" id="{62F939B6-93AF-4DB8-9C6B-D6C7DFDC589F}" vid="{4A3C46E8-61CC-4603-A589-7422A47A8E4A}"/>
+      <thm15:themeFamily xmlns:thm15="http://schemas.microsoft.com/office/thememl/2012/main" xmlns="" name="Office Theme" id="{62F939B6-93AF-4DB8-9C6B-D6C7DFDC589F}" vid="{4A3C46E8-61CC-4603-A589-7422A47A8E4A}"/>
     </a:ext>
   </a:extLst>
 </a:theme>

</xml_diff>